<commit_message>
0803 update code and PPT.
</commit_message>
<xml_diff>
--- a/server i18n.pptx
+++ b/server i18n.pptx
@@ -16,8 +16,9 @@
     <p:sldId id="264" r:id="rId13"/>
     <p:sldId id="265" r:id="rId14"/>
     <p:sldId id="266" r:id="rId15"/>
-    <p:sldId id="267" r:id="rId16"/>
-    <p:sldId id="268" r:id="rId17"/>
+    <p:sldId id="268" r:id="rId16"/>
+    <p:sldId id="271" r:id="rId17"/>
+    <p:sldId id="270" r:id="rId18"/>
   </p:sldIdLst>
   <p:sldSz cx="12192000" cy="6858000"/>
   <p:notesSz cx="6858000" cy="9144000"/>
@@ -227,7 +228,7 @@
           <a:effectLst/>
           <a:extLst>
             <a:ext uri="{91240B29-F687-4f45-9708-019B960494DF}">
-              <a14:hiddenLine xmlns:a14="http://schemas.microsoft.com/office/drawing/2010/main" xmlns="" w="9525">
+              <a14:hiddenLine xmlns="" xmlns:a14="http://schemas.microsoft.com/office/drawing/2010/main" w="9525">
                 <a:solidFill>
                   <a:srgbClr val="000000"/>
                 </a:solidFill>
@@ -1749,7 +1750,7 @@
           <a:ln/>
           <a:extLst>
             <a:ext uri="{91240B29-F687-4f45-9708-019B960494DF}">
-              <a14:hiddenLine xmlns:a14="http://schemas.microsoft.com/office/drawing/2010/main" xmlns="" w="9525">
+              <a14:hiddenLine xmlns="" xmlns:a14="http://schemas.microsoft.com/office/drawing/2010/main" w="9525">
                 <a:solidFill>
                   <a:srgbClr val="000000"/>
                 </a:solidFill>
@@ -2024,7 +2025,7 @@
           <a:ln/>
           <a:extLst>
             <a:ext uri="{91240B29-F687-4f45-9708-019B960494DF}">
-              <a14:hiddenLine xmlns:a14="http://schemas.microsoft.com/office/drawing/2010/main" xmlns="" w="9525">
+              <a14:hiddenLine xmlns="" xmlns:a14="http://schemas.microsoft.com/office/drawing/2010/main" w="9525">
                 <a:solidFill>
                   <a:srgbClr val="000000"/>
                 </a:solidFill>
@@ -2307,7 +2308,7 @@
           <a:ln/>
           <a:extLst>
             <a:ext uri="{91240B29-F687-4f45-9708-019B960494DF}">
-              <a14:hiddenLine xmlns:a14="http://schemas.microsoft.com/office/drawing/2010/main" xmlns="" w="9525">
+              <a14:hiddenLine xmlns="" xmlns:a14="http://schemas.microsoft.com/office/drawing/2010/main" w="9525">
                 <a:solidFill>
                   <a:srgbClr val="000000"/>
                 </a:solidFill>
@@ -2933,7 +2934,7 @@
           <a:ln/>
           <a:extLst>
             <a:ext uri="{91240B29-F687-4f45-9708-019B960494DF}">
-              <a14:hiddenLine xmlns:a14="http://schemas.microsoft.com/office/drawing/2010/main" xmlns="" w="9525">
+              <a14:hiddenLine xmlns="" xmlns:a14="http://schemas.microsoft.com/office/drawing/2010/main" w="9525">
                 <a:solidFill>
                   <a:srgbClr val="000000"/>
                 </a:solidFill>
@@ -3272,7 +3273,7 @@
           <a:ln/>
           <a:extLst>
             <a:ext uri="{91240B29-F687-4f45-9708-019B960494DF}">
-              <a14:hiddenLine xmlns:a14="http://schemas.microsoft.com/office/drawing/2010/main" xmlns="" w="9525">
+              <a14:hiddenLine xmlns="" xmlns:a14="http://schemas.microsoft.com/office/drawing/2010/main" w="9525">
                 <a:solidFill>
                   <a:srgbClr val="000000"/>
                 </a:solidFill>
@@ -3749,7 +3750,7 @@
           <a:ln/>
           <a:extLst>
             <a:ext uri="{91240B29-F687-4f45-9708-019B960494DF}">
-              <a14:hiddenLine xmlns:a14="http://schemas.microsoft.com/office/drawing/2010/main" xmlns="" w="9525">
+              <a14:hiddenLine xmlns="" xmlns:a14="http://schemas.microsoft.com/office/drawing/2010/main" w="9525">
                 <a:solidFill>
                   <a:srgbClr val="000000"/>
                 </a:solidFill>
@@ -4178,7 +4179,7 @@
           <a:ln/>
           <a:extLst>
             <a:ext uri="{91240B29-F687-4f45-9708-019B960494DF}">
-              <a14:hiddenLine xmlns:a14="http://schemas.microsoft.com/office/drawing/2010/main" xmlns="" w="9525">
+              <a14:hiddenLine xmlns="" xmlns:a14="http://schemas.microsoft.com/office/drawing/2010/main" w="9525">
                 <a:solidFill>
                   <a:srgbClr val="000000"/>
                 </a:solidFill>
@@ -5531,35 +5532,43 @@
           <a:bodyPr/>
           <a:lstStyle/>
           <a:p>
+            <a:r>
+              <a:rPr lang="en-US" altLang="zh-CN" dirty="0" err="1"/>
+              <a:t>ResourceBundleMessageSource</a:t>
+            </a:r>
             <a:endParaRPr lang="zh-CN" altLang="en-US" dirty="0"/>
           </a:p>
         </p:txBody>
       </p:sp>
-      <p:sp>
-        <p:nvSpPr>
-          <p:cNvPr id="5" name="内容占位符 4">
+      <p:pic>
+        <p:nvPicPr>
+          <p:cNvPr id="3" name="内容占位符 2">
             <a:extLst>
               <a:ext uri="{FF2B5EF4-FFF2-40B4-BE49-F238E27FC236}">
-                <a16:creationId xmlns:a16="http://schemas.microsoft.com/office/drawing/2014/main" id="{5B906272-1B9D-FC20-ED8F-EAB480AD744B}"/>
+                <a16:creationId xmlns:a16="http://schemas.microsoft.com/office/drawing/2014/main" id="{8A330C59-57E6-9DD2-AFED-6894EE11CD4D}"/>
               </a:ext>
             </a:extLst>
           </p:cNvPr>
-          <p:cNvSpPr>
-            <a:spLocks noGrp="1"/>
-          </p:cNvSpPr>
+          <p:cNvPicPr>
+            <a:picLocks noGrp="1" noChangeAspect="1"/>
+          </p:cNvPicPr>
           <p:nvPr>
             <p:ph idx="1"/>
           </p:nvPr>
-        </p:nvSpPr>
-        <p:spPr/>
-        <p:txBody>
-          <a:bodyPr/>
-          <a:lstStyle/>
-          <a:p>
-            <a:endParaRPr lang="en-US" altLang="zh-CN" dirty="0"/>
-          </a:p>
-        </p:txBody>
-      </p:sp>
+        </p:nvPicPr>
+        <p:blipFill>
+          <a:blip r:embed="rId2"/>
+          <a:stretch>
+            <a:fillRect/>
+          </a:stretch>
+        </p:blipFill>
+        <p:spPr>
+          <a:xfrm>
+            <a:off x="2746780" y="2288599"/>
+            <a:ext cx="7032219" cy="3794511"/>
+          </a:xfrm>
+        </p:spPr>
+      </p:pic>
     </p:spTree>
     <p:extLst>
       <p:ext uri="{BB962C8B-B14F-4D97-AF65-F5344CB8AC3E}">
@@ -5611,35 +5620,47 @@
           <a:bodyPr/>
           <a:lstStyle/>
           <a:p>
+            <a:r>
+              <a:rPr lang="en-US" altLang="zh-CN" dirty="0" err="1"/>
+              <a:t>messageSource.getMessage</a:t>
+            </a:r>
+            <a:r>
+              <a:rPr lang="en-US" altLang="zh-CN" dirty="0"/>
+              <a:t>()</a:t>
+            </a:r>
             <a:endParaRPr lang="zh-CN" altLang="en-US" dirty="0"/>
           </a:p>
         </p:txBody>
       </p:sp>
-      <p:sp>
-        <p:nvSpPr>
-          <p:cNvPr id="5" name="内容占位符 4">
+      <p:pic>
+        <p:nvPicPr>
+          <p:cNvPr id="3" name="内容占位符 2">
             <a:extLst>
               <a:ext uri="{FF2B5EF4-FFF2-40B4-BE49-F238E27FC236}">
-                <a16:creationId xmlns:a16="http://schemas.microsoft.com/office/drawing/2014/main" id="{5B906272-1B9D-FC20-ED8F-EAB480AD744B}"/>
+                <a16:creationId xmlns:a16="http://schemas.microsoft.com/office/drawing/2014/main" id="{68C7A7BB-D795-2EB8-75E6-C3EAC04CFB02}"/>
               </a:ext>
             </a:extLst>
           </p:cNvPr>
-          <p:cNvSpPr>
-            <a:spLocks noGrp="1"/>
-          </p:cNvSpPr>
+          <p:cNvPicPr>
+            <a:picLocks noGrp="1" noChangeAspect="1"/>
+          </p:cNvPicPr>
           <p:nvPr>
             <p:ph idx="1"/>
           </p:nvPr>
-        </p:nvSpPr>
-        <p:spPr/>
-        <p:txBody>
-          <a:bodyPr/>
-          <a:lstStyle/>
-          <a:p>
-            <a:endParaRPr lang="en-US" altLang="zh-CN" dirty="0"/>
-          </a:p>
-        </p:txBody>
-      </p:sp>
+        </p:nvPicPr>
+        <p:blipFill>
+          <a:blip r:embed="rId2"/>
+          <a:stretch>
+            <a:fillRect/>
+          </a:stretch>
+        </p:blipFill>
+        <p:spPr>
+          <a:xfrm>
+            <a:off x="1505524" y="3077173"/>
+            <a:ext cx="9180952" cy="1942857"/>
+          </a:xfrm>
+        </p:spPr>
+      </p:pic>
     </p:spTree>
     <p:extLst>
       <p:ext uri="{BB962C8B-B14F-4D97-AF65-F5344CB8AC3E}">
@@ -5691,39 +5712,59 @@
           <a:bodyPr/>
           <a:lstStyle/>
           <a:p>
+            <a:r>
+              <a:rPr lang="en-US" altLang="zh-CN" dirty="0" err="1"/>
+              <a:t>getMessage</a:t>
+            </a:r>
+            <a:r>
+              <a:rPr lang="en-US" altLang="zh-CN" dirty="0"/>
+              <a:t>() -&gt; </a:t>
+            </a:r>
+            <a:r>
+              <a:rPr lang="en-US" altLang="zh-CN" dirty="0" err="1"/>
+              <a:t>getObject</a:t>
+            </a:r>
+            <a:r>
+              <a:rPr lang="en-US" altLang="zh-CN" dirty="0"/>
+              <a:t>()</a:t>
+            </a:r>
             <a:endParaRPr lang="zh-CN" altLang="en-US" dirty="0"/>
           </a:p>
         </p:txBody>
       </p:sp>
-      <p:sp>
-        <p:nvSpPr>
-          <p:cNvPr id="5" name="内容占位符 4">
+      <p:pic>
+        <p:nvPicPr>
+          <p:cNvPr id="11" name="内容占位符 10">
             <a:extLst>
               <a:ext uri="{FF2B5EF4-FFF2-40B4-BE49-F238E27FC236}">
-                <a16:creationId xmlns:a16="http://schemas.microsoft.com/office/drawing/2014/main" id="{5B906272-1B9D-FC20-ED8F-EAB480AD744B}"/>
+                <a16:creationId xmlns:a16="http://schemas.microsoft.com/office/drawing/2014/main" id="{ED5AD276-56DC-DBE9-1DE7-1555F73A4050}"/>
               </a:ext>
             </a:extLst>
           </p:cNvPr>
-          <p:cNvSpPr>
-            <a:spLocks noGrp="1"/>
-          </p:cNvSpPr>
+          <p:cNvPicPr>
+            <a:picLocks noGrp="1" noChangeAspect="1"/>
+          </p:cNvPicPr>
           <p:nvPr>
             <p:ph idx="1"/>
           </p:nvPr>
-        </p:nvSpPr>
-        <p:spPr/>
-        <p:txBody>
-          <a:bodyPr/>
-          <a:lstStyle/>
-          <a:p>
-            <a:endParaRPr lang="en-US" altLang="zh-CN" dirty="0"/>
-          </a:p>
-        </p:txBody>
-      </p:sp>
+        </p:nvPicPr>
+        <p:blipFill>
+          <a:blip r:embed="rId2"/>
+          <a:stretch>
+            <a:fillRect/>
+          </a:stretch>
+        </p:blipFill>
+        <p:spPr>
+          <a:xfrm>
+            <a:off x="2900762" y="2360029"/>
+            <a:ext cx="6390476" cy="3361905"/>
+          </a:xfrm>
+        </p:spPr>
+      </p:pic>
     </p:spTree>
     <p:extLst>
       <p:ext uri="{BB962C8B-B14F-4D97-AF65-F5344CB8AC3E}">
-        <p14:creationId xmlns:p14="http://schemas.microsoft.com/office/powerpoint/2010/main" val="1545550987"/>
+        <p14:creationId xmlns:p14="http://schemas.microsoft.com/office/powerpoint/2010/main" val="446519530"/>
       </p:ext>
     </p:extLst>
   </p:cSld>
@@ -5771,39 +5812,165 @@
           <a:bodyPr/>
           <a:lstStyle/>
           <a:p>
+            <a:r>
+              <a:rPr lang="en-US" altLang="zh-CN" dirty="0"/>
+              <a:t>stack</a:t>
+            </a:r>
             <a:endParaRPr lang="zh-CN" altLang="en-US" dirty="0"/>
           </a:p>
         </p:txBody>
       </p:sp>
-      <p:sp>
-        <p:nvSpPr>
-          <p:cNvPr id="5" name="内容占位符 4">
+      <p:pic>
+        <p:nvPicPr>
+          <p:cNvPr id="3" name="内容占位符 2">
             <a:extLst>
               <a:ext uri="{FF2B5EF4-FFF2-40B4-BE49-F238E27FC236}">
-                <a16:creationId xmlns:a16="http://schemas.microsoft.com/office/drawing/2014/main" id="{5B906272-1B9D-FC20-ED8F-EAB480AD744B}"/>
+                <a16:creationId xmlns:a16="http://schemas.microsoft.com/office/drawing/2014/main" id="{8B246A11-DCAE-253C-8269-2B895EB113E1}"/>
               </a:ext>
             </a:extLst>
           </p:cNvPr>
-          <p:cNvSpPr>
-            <a:spLocks noGrp="1"/>
-          </p:cNvSpPr>
+          <p:cNvPicPr>
+            <a:picLocks noGrp="1" noChangeAspect="1"/>
+          </p:cNvPicPr>
           <p:nvPr>
             <p:ph idx="1"/>
           </p:nvPr>
-        </p:nvSpPr>
-        <p:spPr/>
-        <p:txBody>
-          <a:bodyPr/>
-          <a:lstStyle/>
-          <a:p>
-            <a:endParaRPr lang="en-US" altLang="zh-CN" dirty="0"/>
-          </a:p>
-        </p:txBody>
-      </p:sp>
+        </p:nvPicPr>
+        <p:blipFill>
+          <a:blip r:embed="rId2"/>
+          <a:stretch>
+            <a:fillRect/>
+          </a:stretch>
+        </p:blipFill>
+        <p:spPr>
+          <a:xfrm>
+            <a:off x="1542078" y="2222500"/>
+            <a:ext cx="9107844" cy="3636963"/>
+          </a:xfrm>
+        </p:spPr>
+      </p:pic>
     </p:spTree>
     <p:extLst>
       <p:ext uri="{BB962C8B-B14F-4D97-AF65-F5344CB8AC3E}">
-        <p14:creationId xmlns:p14="http://schemas.microsoft.com/office/powerpoint/2010/main" val="446519530"/>
+        <p14:creationId xmlns:p14="http://schemas.microsoft.com/office/powerpoint/2010/main" val="1469292168"/>
+      </p:ext>
+    </p:extLst>
+  </p:cSld>
+  <p:clrMapOvr>
+    <a:masterClrMapping/>
+  </p:clrMapOvr>
+</p:sld>
+</file>
+
+<file path=ppt/slides/slide14.xml><?xml version="1.0" encoding="utf-8"?>
+<p:sld xmlns:a="http://schemas.openxmlformats.org/drawingml/2006/main" xmlns:r="http://schemas.openxmlformats.org/officeDocument/2006/relationships" xmlns:p="http://schemas.openxmlformats.org/presentationml/2006/main">
+  <p:cSld>
+    <p:spTree>
+      <p:nvGrpSpPr>
+        <p:cNvPr id="1" name=""/>
+        <p:cNvGrpSpPr/>
+        <p:nvPr/>
+      </p:nvGrpSpPr>
+      <p:grpSpPr>
+        <a:xfrm>
+          <a:off x="0" y="0"/>
+          <a:ext cx="0" cy="0"/>
+          <a:chOff x="0" y="0"/>
+          <a:chExt cx="0" cy="0"/>
+        </a:xfrm>
+      </p:grpSpPr>
+      <p:sp>
+        <p:nvSpPr>
+          <p:cNvPr id="4" name="标题 3">
+            <a:extLst>
+              <a:ext uri="{FF2B5EF4-FFF2-40B4-BE49-F238E27FC236}">
+                <a16:creationId xmlns:a16="http://schemas.microsoft.com/office/drawing/2014/main" id="{B37BDF89-804C-1EAE-FC42-8A83CC22B745}"/>
+              </a:ext>
+            </a:extLst>
+          </p:cNvPr>
+          <p:cNvSpPr>
+            <a:spLocks noGrp="1"/>
+          </p:cNvSpPr>
+          <p:nvPr>
+            <p:ph type="title"/>
+          </p:nvPr>
+        </p:nvSpPr>
+        <p:spPr/>
+        <p:txBody>
+          <a:bodyPr/>
+          <a:lstStyle/>
+          <a:p>
+            <a:r>
+              <a:rPr lang="en-US" altLang="zh-CN" dirty="0"/>
+              <a:t>Demo</a:t>
+            </a:r>
+            <a:endParaRPr lang="zh-CN" altLang="en-US" dirty="0"/>
+          </a:p>
+        </p:txBody>
+      </p:sp>
+      <p:pic>
+        <p:nvPicPr>
+          <p:cNvPr id="7" name="内容占位符 6">
+            <a:extLst>
+              <a:ext uri="{FF2B5EF4-FFF2-40B4-BE49-F238E27FC236}">
+                <a16:creationId xmlns:a16="http://schemas.microsoft.com/office/drawing/2014/main" id="{DA7861DF-F739-A84D-14D2-D0106B434701}"/>
+              </a:ext>
+            </a:extLst>
+          </p:cNvPr>
+          <p:cNvPicPr>
+            <a:picLocks noGrp="1" noChangeAspect="1"/>
+          </p:cNvPicPr>
+          <p:nvPr>
+            <p:ph idx="1"/>
+          </p:nvPr>
+        </p:nvPicPr>
+        <p:blipFill>
+          <a:blip r:embed="rId2"/>
+          <a:stretch>
+            <a:fillRect/>
+          </a:stretch>
+        </p:blipFill>
+        <p:spPr>
+          <a:xfrm>
+            <a:off x="116714" y="2463732"/>
+            <a:ext cx="5836413" cy="3395731"/>
+          </a:xfrm>
+        </p:spPr>
+      </p:pic>
+      <p:pic>
+        <p:nvPicPr>
+          <p:cNvPr id="11" name="图片 10">
+            <a:extLst>
+              <a:ext uri="{FF2B5EF4-FFF2-40B4-BE49-F238E27FC236}">
+                <a16:creationId xmlns:a16="http://schemas.microsoft.com/office/drawing/2014/main" id="{22859BAF-B427-6D35-87E4-796C4D05B0A1}"/>
+              </a:ext>
+            </a:extLst>
+          </p:cNvPr>
+          <p:cNvPicPr>
+            <a:picLocks noChangeAspect="1"/>
+          </p:cNvPicPr>
+          <p:nvPr/>
+        </p:nvPicPr>
+        <p:blipFill>
+          <a:blip r:embed="rId3"/>
+          <a:stretch>
+            <a:fillRect/>
+          </a:stretch>
+        </p:blipFill>
+        <p:spPr>
+          <a:xfrm>
+            <a:off x="6095999" y="2463732"/>
+            <a:ext cx="5979287" cy="3395731"/>
+          </a:xfrm>
+          <a:prstGeom prst="rect">
+            <a:avLst/>
+          </a:prstGeom>
+        </p:spPr>
+      </p:pic>
+    </p:spTree>
+    <p:extLst>
+      <p:ext uri="{BB962C8B-B14F-4D97-AF65-F5344CB8AC3E}">
+        <p14:creationId xmlns:p14="http://schemas.microsoft.com/office/powerpoint/2010/main" val="1266701260"/>
       </p:ext>
     </p:extLst>
   </p:cSld>
@@ -6111,7 +6278,7 @@
           <a:effectLst/>
           <a:extLst>
             <a:ext uri="{91240B29-F687-4f45-9708-019B960494DF}">
-              <a14:hiddenLine xmlns:a16="http://schemas.microsoft.com/office/drawing/2014/main" xmlns:p14="http://schemas.microsoft.com/office/powerpoint/2010/main" xmlns:a14="http://schemas.microsoft.com/office/drawing/2010/main" xmlns="" w="9525">
+              <a14:hiddenLine xmlns="" xmlns:a14="http://schemas.microsoft.com/office/drawing/2010/main" xmlns:p14="http://schemas.microsoft.com/office/powerpoint/2010/main" xmlns:a16="http://schemas.microsoft.com/office/drawing/2014/main" w="9525">
                 <a:solidFill>
                   <a:srgbClr val="000000"/>
                 </a:solidFill>
@@ -6166,10 +6333,9 @@
           <a:lstStyle/>
           <a:p>
             <a:r>
-              <a:rPr lang="en-US" altLang="zh-CN" dirty="0"/>
-              <a:t>Content</a:t>
-            </a:r>
-            <a:endParaRPr lang="zh-CN" altLang="en-US" dirty="0"/>
+              <a:rPr lang="zh-CN" altLang="en-US" dirty="0"/>
+              <a:t>目录</a:t>
+            </a:r>
           </a:p>
         </p:txBody>
       </p:sp>
@@ -6207,7 +6373,7 @@
               <a:buAutoNum type="arabicPeriod"/>
             </a:pPr>
             <a:r>
-              <a:rPr lang="en-US" altLang="zh-CN"/>
+              <a:rPr lang="en-US" altLang="zh-CN" dirty="0"/>
               <a:t>What</a:t>
             </a:r>
           </a:p>
@@ -6217,7 +6383,7 @@
               <a:buAutoNum type="arabicPeriod"/>
             </a:pPr>
             <a:r>
-              <a:rPr lang="en-US" altLang="zh-CN"/>
+              <a:rPr lang="en-US" altLang="zh-CN" dirty="0"/>
               <a:t>Why</a:t>
             </a:r>
           </a:p>
@@ -6227,7 +6393,7 @@
               <a:buAutoNum type="arabicPeriod"/>
             </a:pPr>
             <a:r>
-              <a:rPr lang="en-US" altLang="zh-CN"/>
+              <a:rPr lang="en-US" altLang="zh-CN" dirty="0"/>
               <a:t>Old solution</a:t>
             </a:r>
           </a:p>
@@ -6237,25 +6403,25 @@
               <a:buAutoNum type="arabicPeriod"/>
             </a:pPr>
             <a:r>
-              <a:rPr lang="en-US" altLang="zh-CN"/>
+              <a:rPr lang="en-US" altLang="zh-CN" dirty="0"/>
               <a:t>Current solution(front-end i18n)</a:t>
             </a:r>
           </a:p>
           <a:p>
             <a:pPr lvl="2"/>
             <a:r>
-              <a:rPr lang="zh-CN" altLang="en-US"/>
+              <a:rPr lang="zh-CN" altLang="en-US" dirty="0"/>
               <a:t>优点</a:t>
             </a:r>
-            <a:endParaRPr lang="en-US" altLang="zh-CN"/>
+            <a:endParaRPr lang="en-US" altLang="zh-CN" dirty="0"/>
           </a:p>
           <a:p>
             <a:pPr lvl="2"/>
             <a:r>
-              <a:rPr lang="zh-CN" altLang="en-US"/>
+              <a:rPr lang="zh-CN" altLang="en-US" dirty="0"/>
               <a:t>缺点</a:t>
             </a:r>
-            <a:endParaRPr lang="en-US" altLang="zh-CN"/>
+            <a:endParaRPr lang="en-US" altLang="zh-CN" dirty="0"/>
           </a:p>
           <a:p>
             <a:pPr marL="800100" lvl="1" indent="-342900">
@@ -6263,25 +6429,25 @@
               <a:buAutoNum type="arabicPeriod"/>
             </a:pPr>
             <a:r>
-              <a:rPr lang="en-US" altLang="zh-CN"/>
+              <a:rPr lang="en-US" altLang="zh-CN" dirty="0"/>
               <a:t>Server i18n</a:t>
             </a:r>
           </a:p>
           <a:p>
             <a:pPr lvl="2"/>
             <a:r>
-              <a:rPr lang="zh-CN" altLang="en-US"/>
+              <a:rPr lang="zh-CN" altLang="en-US" dirty="0"/>
               <a:t>优点</a:t>
             </a:r>
-            <a:endParaRPr lang="en-US" altLang="zh-CN"/>
+            <a:endParaRPr lang="en-US" altLang="zh-CN" dirty="0"/>
           </a:p>
           <a:p>
             <a:pPr lvl="2"/>
             <a:r>
-              <a:rPr lang="zh-CN" altLang="en-US"/>
+              <a:rPr lang="zh-CN" altLang="en-US" dirty="0"/>
               <a:t>缺点</a:t>
             </a:r>
-            <a:endParaRPr lang="en-US" altLang="zh-CN"/>
+            <a:endParaRPr lang="en-US" altLang="zh-CN" dirty="0"/>
           </a:p>
           <a:p>
             <a:pPr>
@@ -6289,7 +6455,7 @@
               <a:buAutoNum type="arabicPeriod"/>
             </a:pPr>
             <a:r>
-              <a:rPr lang="en-US" altLang="zh-CN"/>
+              <a:rPr lang="en-US" altLang="zh-CN" dirty="0"/>
               <a:t>How</a:t>
             </a:r>
             <a:endParaRPr lang="zh-CN" altLang="en-US" dirty="0"/>
@@ -6963,6 +7129,36 @@
           <a:bodyPr/>
           <a:lstStyle/>
           <a:p>
+            <a:pPr>
+              <a:buFont typeface="Wingdings" panose="05000000000000000000" pitchFamily="2" charset="2"/>
+              <a:buChar char="Ø"/>
+            </a:pPr>
+            <a:r>
+              <a:rPr lang="en-US" altLang="zh-CN" dirty="0"/>
+              <a:t>2.1 Old solution</a:t>
+            </a:r>
+          </a:p>
+          <a:p>
+            <a:pPr>
+              <a:buFont typeface="Wingdings" panose="05000000000000000000" pitchFamily="2" charset="2"/>
+              <a:buChar char="Ø"/>
+            </a:pPr>
+            <a:r>
+              <a:rPr lang="en-US" altLang="zh-CN" dirty="0"/>
+              <a:t>2.2 Current solution(front-end i18n)</a:t>
+            </a:r>
+          </a:p>
+          <a:p>
+            <a:pPr>
+              <a:buFont typeface="Wingdings" panose="05000000000000000000" pitchFamily="2" charset="2"/>
+              <a:buChar char="Ø"/>
+            </a:pPr>
+            <a:r>
+              <a:rPr lang="en-US" altLang="zh-CN" dirty="0"/>
+              <a:t>2.3 Server i18n</a:t>
+            </a:r>
+          </a:p>
+          <a:p>
             <a:endParaRPr lang="en-US" altLang="zh-CN" dirty="0"/>
           </a:p>
         </p:txBody>
@@ -7099,7 +7295,7 @@
           <a:ln/>
           <a:extLst>
             <a:ext uri="{91240B29-F687-4f45-9708-019B960494DF}">
-              <a14:hiddenLine xmlns="" xmlns:a16="http://schemas.microsoft.com/office/drawing/2014/main" xmlns:p14="http://schemas.microsoft.com/office/powerpoint/2010/main" xmlns:a14="http://schemas.microsoft.com/office/drawing/2010/main" w="9525">
+              <a14:hiddenLine xmlns:a14="http://schemas.microsoft.com/office/drawing/2010/main" xmlns:p14="http://schemas.microsoft.com/office/powerpoint/2010/main" xmlns:a16="http://schemas.microsoft.com/office/drawing/2014/main" xmlns="" w="9525">
                 <a:solidFill>
                   <a:srgbClr val="000000"/>
                 </a:solidFill>
@@ -7413,7 +7609,7 @@
           <a:lstStyle/>
           <a:p>
             <a:r>
-              <a:rPr lang="en-US" altLang="zh-CN" sz="3200"/>
+              <a:rPr lang="en-US" altLang="zh-CN" sz="3200" dirty="0"/>
               <a:t>2.1 Old solution</a:t>
             </a:r>
           </a:p>
@@ -7457,7 +7653,7 @@
                   <a:srgbClr val="FFFFFF"/>
                 </a:solidFill>
               </a:rPr>
-              <a:t>优点</a:t>
+              <a:t>缺点：</a:t>
             </a:r>
             <a:r>
               <a:rPr lang="en-US" altLang="zh-CN" sz="1600" dirty="0">
@@ -7465,29 +7661,7 @@
                   <a:srgbClr val="FFFFFF"/>
                 </a:solidFill>
               </a:rPr>
-              <a:t>: No code changes.</a:t>
-            </a:r>
-          </a:p>
-          <a:p>
-            <a:pPr>
-              <a:buFont typeface="Wingdings 2" charset="2"/>
-              <a:buChar char=""/>
-            </a:pPr>
-            <a:r>
-              <a:rPr lang="zh-CN" altLang="en-US" sz="1600" dirty="0">
-                <a:solidFill>
-                  <a:srgbClr val="FFFFFF"/>
-                </a:solidFill>
-              </a:rPr>
-              <a:t>缺点：</a:t>
-            </a:r>
-            <a:r>
-              <a:rPr lang="en-US" altLang="zh-CN" sz="1600" dirty="0">
-                <a:solidFill>
-                  <a:srgbClr val="FFFFFF"/>
-                </a:solidFill>
-              </a:rPr>
-              <a:t>The error message from the server is not be globalized.</a:t>
+              <a:t>The error message from the server is not be localized.</a:t>
             </a:r>
             <a:endParaRPr lang="zh-CN" altLang="en-US" sz="1600" dirty="0">
               <a:solidFill>
@@ -8107,51 +8281,96 @@
           <a:lstStyle/>
           <a:p>
             <a:r>
-              <a:rPr lang="en-US" altLang="zh-CN" sz="4000" dirty="0">
+              <a:rPr lang="en-US" altLang="zh-CN" sz="4000">
                 <a:solidFill>
                   <a:srgbClr val="FFFFFF"/>
                 </a:solidFill>
               </a:rPr>
-              <a:t>2.2 Current solution</a:t>
+              <a:t>2.2 workflow</a:t>
             </a:r>
             <a:endParaRPr lang="zh-CN" altLang="en-US" dirty="0"/>
           </a:p>
         </p:txBody>
       </p:sp>
-      <p:sp>
-        <p:nvSpPr>
-          <p:cNvPr id="5" name="内容占位符 4">
+      <p:pic>
+        <p:nvPicPr>
+          <p:cNvPr id="8" name="内容占位符 7">
             <a:extLst>
               <a:ext uri="{FF2B5EF4-FFF2-40B4-BE49-F238E27FC236}">
-                <a16:creationId xmlns:a16="http://schemas.microsoft.com/office/drawing/2014/main" id="{5B906272-1B9D-FC20-ED8F-EAB480AD744B}"/>
+                <a16:creationId xmlns:a16="http://schemas.microsoft.com/office/drawing/2014/main" id="{6AA2B8B1-64FC-0A38-B3C0-047EFC12F261}"/>
               </a:ext>
             </a:extLst>
           </p:cNvPr>
-          <p:cNvSpPr>
-            <a:spLocks noGrp="1"/>
-          </p:cNvSpPr>
+          <p:cNvPicPr>
+            <a:picLocks noGrp="1" noChangeAspect="1"/>
+          </p:cNvPicPr>
           <p:nvPr>
             <p:ph idx="1"/>
           </p:nvPr>
-        </p:nvSpPr>
-        <p:spPr/>
-        <p:txBody>
-          <a:bodyPr/>
+        </p:nvPicPr>
+        <p:blipFill>
+          <a:blip r:embed="rId2"/>
+          <a:stretch>
+            <a:fillRect/>
+          </a:stretch>
+        </p:blipFill>
+        <p:spPr bwMode="auto">
+          <a:xfrm>
+            <a:off x="388840" y="2712572"/>
+            <a:ext cx="11414319" cy="3949700"/>
+          </a:xfrm>
+          <a:prstGeom prst="rect">
+            <a:avLst/>
+          </a:prstGeom>
+          <a:noFill/>
+          <a:extLst>
+            <a:ext uri="{909E8E84-426E-40DD-AFC4-6F175D3DCCD1}">
+              <a14:hiddenFill xmlns:a14="http://schemas.microsoft.com/office/drawing/2010/main">
+                <a:solidFill>
+                  <a:srgbClr val="FFFFFF"/>
+                </a:solidFill>
+              </a14:hiddenFill>
+            </a:ext>
+          </a:extLst>
+        </p:spPr>
+      </p:pic>
+      <p:sp>
+        <p:nvSpPr>
+          <p:cNvPr id="9" name="文本框 8">
+            <a:extLst>
+              <a:ext uri="{FF2B5EF4-FFF2-40B4-BE49-F238E27FC236}">
+                <a16:creationId xmlns:a16="http://schemas.microsoft.com/office/drawing/2014/main" id="{2AB77538-C1EB-453C-6257-B4236D1ACE76}"/>
+              </a:ext>
+            </a:extLst>
+          </p:cNvPr>
+          <p:cNvSpPr txBox="1"/>
+          <p:nvPr/>
+        </p:nvSpPr>
+        <p:spPr>
+          <a:xfrm>
+            <a:off x="388840" y="2228940"/>
+            <a:ext cx="4952780" cy="369332"/>
+          </a:xfrm>
+          <a:prstGeom prst="rect">
+            <a:avLst/>
+          </a:prstGeom>
+          <a:noFill/>
+        </p:spPr>
+        <p:txBody>
+          <a:bodyPr wrap="square" rtlCol="0">
+            <a:spAutoFit/>
+          </a:bodyPr>
           <a:lstStyle/>
           <a:p>
             <a:r>
-              <a:rPr lang="zh-CN" altLang="en-US" dirty="0"/>
-              <a:t>插入</a:t>
-            </a:r>
-            <a:r>
-              <a:rPr lang="en-US" altLang="zh-CN" dirty="0"/>
-              <a:t>code</a:t>
-            </a:r>
-            <a:r>
-              <a:rPr lang="zh-CN" altLang="en-US" dirty="0"/>
-              <a:t>流程图片</a:t>
-            </a:r>
-            <a:endParaRPr lang="en-US" altLang="zh-CN" dirty="0"/>
+              <a:rPr lang="en-US" altLang="zh-CN" b="0" i="0" u="none" strike="noStrike" dirty="0">
+                <a:effectLst/>
+                <a:latin typeface="Slack-Lato"/>
+                <a:hlinkClick r:id="rId3"/>
+              </a:rPr>
+              <a:t>How to globalize error message from the server</a:t>
+            </a:r>
+            <a:endParaRPr lang="zh-CN" altLang="en-US" dirty="0"/>
           </a:p>
         </p:txBody>
       </p:sp>
@@ -8174,7 +8393,7 @@
     <p:bg>
       <p:bgPr>
         <a:solidFill>
-          <a:schemeClr val="bg1"/>
+          <a:schemeClr val="bg2"/>
         </a:solidFill>
         <a:effectLst/>
       </p:bgPr>
@@ -8195,265 +8414,6 @@
       </p:grpSpPr>
       <p:sp>
         <p:nvSpPr>
-          <p:cNvPr id="26" name="Rectangle 25">
-            <a:extLst>
-              <a:ext uri="{FF2B5EF4-FFF2-40B4-BE49-F238E27FC236}">
-                <a16:creationId xmlns:a16="http://schemas.microsoft.com/office/drawing/2014/main" id="{8C1FC8BA-94E6-44F7-B346-6A2215E66D2E}"/>
-              </a:ext>
-              <a:ext uri="{C183D7F6-B498-43B3-948B-1728B52AA6E4}">
-                <adec:decorative xmlns:adec="http://schemas.microsoft.com/office/drawing/2017/decorative" val="1"/>
-              </a:ext>
-            </a:extLst>
-          </p:cNvPr>
-          <p:cNvSpPr>
-            <a:spLocks noGrp="1" noRot="1" noChangeAspect="1" noMove="1" noResize="1" noEditPoints="1" noAdjustHandles="1" noChangeArrowheads="1" noChangeShapeType="1" noTextEdit="1"/>
-          </p:cNvSpPr>
-          <p:nvPr>
-            <p:extLst>
-              <p:ext uri="{386F3935-93C4-4BCD-93E2-E3B085C9AB24}">
-                <p16:designElem xmlns:p16="http://schemas.microsoft.com/office/powerpoint/2015/main" val="1"/>
-              </p:ext>
-            </p:extLst>
-          </p:nvPr>
-        </p:nvSpPr>
-        <p:spPr>
-          <a:xfrm>
-            <a:off x="0" y="0"/>
-            <a:ext cx="12188952" cy="6858000"/>
-          </a:xfrm>
-          <a:prstGeom prst="rect">
-            <a:avLst/>
-          </a:prstGeom>
-          <a:solidFill>
-            <a:schemeClr val="bg1"/>
-          </a:solidFill>
-          <a:ln>
-            <a:noFill/>
-          </a:ln>
-        </p:spPr>
-        <p:style>
-          <a:lnRef idx="2">
-            <a:schemeClr val="accent1">
-              <a:shade val="50000"/>
-            </a:schemeClr>
-          </a:lnRef>
-          <a:fillRef idx="1">
-            <a:schemeClr val="accent1"/>
-          </a:fillRef>
-          <a:effectRef idx="0">
-            <a:schemeClr val="accent1"/>
-          </a:effectRef>
-          <a:fontRef idx="minor">
-            <a:schemeClr val="lt1"/>
-          </a:fontRef>
-        </p:style>
-        <p:txBody>
-          <a:bodyPr rtlCol="0" anchor="ctr"/>
-          <a:lstStyle/>
-          <a:p>
-            <a:pPr algn="ctr"/>
-            <a:endParaRPr lang="en-US"/>
-          </a:p>
-        </p:txBody>
-      </p:sp>
-      <p:sp>
-        <p:nvSpPr>
-          <p:cNvPr id="28" name="Freeform 23">
-            <a:extLst>
-              <a:ext uri="{FF2B5EF4-FFF2-40B4-BE49-F238E27FC236}">
-                <a16:creationId xmlns:a16="http://schemas.microsoft.com/office/drawing/2014/main" id="{A8329D92-4903-43FF-90F4-878F5D3F1D22}"/>
-              </a:ext>
-              <a:ext uri="{C183D7F6-B498-43B3-948B-1728B52AA6E4}">
-                <adec:decorative xmlns:adec="http://schemas.microsoft.com/office/drawing/2017/decorative" val="1"/>
-              </a:ext>
-            </a:extLst>
-          </p:cNvPr>
-          <p:cNvSpPr>
-            <a:spLocks noGrp="1" noRot="1" noChangeAspect="1" noMove="1" noResize="1" noEditPoints="1" noAdjustHandles="1" noChangeArrowheads="1" noChangeShapeType="1" noTextEdit="1"/>
-          </p:cNvSpPr>
-          <p:nvPr>
-            <p:extLst>
-              <p:ext uri="{386F3935-93C4-4BCD-93E2-E3B085C9AB24}">
-                <p16:designElem xmlns:p16="http://schemas.microsoft.com/office/powerpoint/2015/main" val="1"/>
-              </p:ext>
-            </p:extLst>
-          </p:nvPr>
-        </p:nvSpPr>
-        <p:spPr bwMode="white">
-          <a:xfrm>
-            <a:off x="0" y="0"/>
-            <a:ext cx="4637005" cy="6858000"/>
-          </a:xfrm>
-          <a:custGeom>
-            <a:avLst/>
-            <a:gdLst>
-              <a:gd name="connsiteX0" fmla="*/ 0 w 4637005"/>
-              <a:gd name="connsiteY0" fmla="*/ 0 h 6858000"/>
-              <a:gd name="connsiteX1" fmla="*/ 4637005 w 4637005"/>
-              <a:gd name="connsiteY1" fmla="*/ 0 h 6858000"/>
-              <a:gd name="connsiteX2" fmla="*/ 4637005 w 4637005"/>
-              <a:gd name="connsiteY2" fmla="*/ 1900238 h 6858000"/>
-              <a:gd name="connsiteX3" fmla="*/ 4266589 w 4637005"/>
-              <a:gd name="connsiteY3" fmla="*/ 2178050 h 6858000"/>
-              <a:gd name="connsiteX4" fmla="*/ 4262355 w 4637005"/>
-              <a:gd name="connsiteY4" fmla="*/ 2184400 h 6858000"/>
-              <a:gd name="connsiteX5" fmla="*/ 4256005 w 4637005"/>
-              <a:gd name="connsiteY5" fmla="*/ 2193925 h 6858000"/>
-              <a:gd name="connsiteX6" fmla="*/ 4249655 w 4637005"/>
-              <a:gd name="connsiteY6" fmla="*/ 2201863 h 6858000"/>
-              <a:gd name="connsiteX7" fmla="*/ 4249655 w 4637005"/>
-              <a:gd name="connsiteY7" fmla="*/ 2211388 h 6858000"/>
-              <a:gd name="connsiteX8" fmla="*/ 4249655 w 4637005"/>
-              <a:gd name="connsiteY8" fmla="*/ 2220913 h 6858000"/>
-              <a:gd name="connsiteX9" fmla="*/ 4256005 w 4637005"/>
-              <a:gd name="connsiteY9" fmla="*/ 2228850 h 6858000"/>
-              <a:gd name="connsiteX10" fmla="*/ 4262355 w 4637005"/>
-              <a:gd name="connsiteY10" fmla="*/ 2238375 h 6858000"/>
-              <a:gd name="connsiteX11" fmla="*/ 4266589 w 4637005"/>
-              <a:gd name="connsiteY11" fmla="*/ 2244725 h 6858000"/>
-              <a:gd name="connsiteX12" fmla="*/ 4637005 w 4637005"/>
-              <a:gd name="connsiteY12" fmla="*/ 2522538 h 6858000"/>
-              <a:gd name="connsiteX13" fmla="*/ 4637005 w 4637005"/>
-              <a:gd name="connsiteY13" fmla="*/ 6858000 h 6858000"/>
-              <a:gd name="connsiteX14" fmla="*/ 0 w 4637005"/>
-              <a:gd name="connsiteY14" fmla="*/ 6858000 h 6858000"/>
-            </a:gdLst>
-            <a:ahLst/>
-            <a:cxnLst>
-              <a:cxn ang="0">
-                <a:pos x="connsiteX0" y="connsiteY0"/>
-              </a:cxn>
-              <a:cxn ang="0">
-                <a:pos x="connsiteX1" y="connsiteY1"/>
-              </a:cxn>
-              <a:cxn ang="0">
-                <a:pos x="connsiteX2" y="connsiteY2"/>
-              </a:cxn>
-              <a:cxn ang="0">
-                <a:pos x="connsiteX3" y="connsiteY3"/>
-              </a:cxn>
-              <a:cxn ang="0">
-                <a:pos x="connsiteX4" y="connsiteY4"/>
-              </a:cxn>
-              <a:cxn ang="0">
-                <a:pos x="connsiteX5" y="connsiteY5"/>
-              </a:cxn>
-              <a:cxn ang="0">
-                <a:pos x="connsiteX6" y="connsiteY6"/>
-              </a:cxn>
-              <a:cxn ang="0">
-                <a:pos x="connsiteX7" y="connsiteY7"/>
-              </a:cxn>
-              <a:cxn ang="0">
-                <a:pos x="connsiteX8" y="connsiteY8"/>
-              </a:cxn>
-              <a:cxn ang="0">
-                <a:pos x="connsiteX9" y="connsiteY9"/>
-              </a:cxn>
-              <a:cxn ang="0">
-                <a:pos x="connsiteX10" y="connsiteY10"/>
-              </a:cxn>
-              <a:cxn ang="0">
-                <a:pos x="connsiteX11" y="connsiteY11"/>
-              </a:cxn>
-              <a:cxn ang="0">
-                <a:pos x="connsiteX12" y="connsiteY12"/>
-              </a:cxn>
-              <a:cxn ang="0">
-                <a:pos x="connsiteX13" y="connsiteY13"/>
-              </a:cxn>
-              <a:cxn ang="0">
-                <a:pos x="connsiteX14" y="connsiteY14"/>
-              </a:cxn>
-            </a:cxnLst>
-            <a:rect l="l" t="t" r="r" b="b"/>
-            <a:pathLst>
-              <a:path w="4637005" h="6858000">
-                <a:moveTo>
-                  <a:pt x="0" y="0"/>
-                </a:moveTo>
-                <a:lnTo>
-                  <a:pt x="4637005" y="0"/>
-                </a:lnTo>
-                <a:lnTo>
-                  <a:pt x="4637005" y="1900238"/>
-                </a:lnTo>
-                <a:lnTo>
-                  <a:pt x="4266589" y="2178050"/>
-                </a:lnTo>
-                <a:lnTo>
-                  <a:pt x="4262355" y="2184400"/>
-                </a:lnTo>
-                <a:lnTo>
-                  <a:pt x="4256005" y="2193925"/>
-                </a:lnTo>
-                <a:lnTo>
-                  <a:pt x="4249655" y="2201863"/>
-                </a:lnTo>
-                <a:lnTo>
-                  <a:pt x="4249655" y="2211388"/>
-                </a:lnTo>
-                <a:lnTo>
-                  <a:pt x="4249655" y="2220913"/>
-                </a:lnTo>
-                <a:lnTo>
-                  <a:pt x="4256005" y="2228850"/>
-                </a:lnTo>
-                <a:lnTo>
-                  <a:pt x="4262355" y="2238375"/>
-                </a:lnTo>
-                <a:lnTo>
-                  <a:pt x="4266589" y="2244725"/>
-                </a:lnTo>
-                <a:lnTo>
-                  <a:pt x="4637005" y="2522538"/>
-                </a:lnTo>
-                <a:lnTo>
-                  <a:pt x="4637005" y="6858000"/>
-                </a:lnTo>
-                <a:lnTo>
-                  <a:pt x="0" y="6858000"/>
-                </a:lnTo>
-                <a:close/>
-              </a:path>
-            </a:pathLst>
-          </a:custGeom>
-          <a:solidFill>
-            <a:srgbClr val="262626"/>
-          </a:solidFill>
-          <a:ln>
-            <a:noFill/>
-          </a:ln>
-        </p:spPr>
-        <p:style>
-          <a:lnRef idx="2">
-            <a:schemeClr val="accent1">
-              <a:shade val="50000"/>
-            </a:schemeClr>
-          </a:lnRef>
-          <a:fillRef idx="1">
-            <a:schemeClr val="accent1"/>
-          </a:fillRef>
-          <a:effectRef idx="0">
-            <a:schemeClr val="accent1"/>
-          </a:effectRef>
-          <a:fontRef idx="minor">
-            <a:schemeClr val="lt1"/>
-          </a:fontRef>
-        </p:style>
-        <p:txBody>
-          <a:bodyPr wrap="square" rtlCol="0" anchor="ctr">
-            <a:noAutofit/>
-          </a:bodyPr>
-          <a:lstStyle/>
-          <a:p>
-            <a:pPr algn="ctr"/>
-            <a:endParaRPr lang="en-US"/>
-          </a:p>
-        </p:txBody>
-      </p:sp>
-      <p:sp>
-        <p:nvSpPr>
           <p:cNvPr id="4" name="标题 3">
             <a:extLst>
               <a:ext uri="{FF2B5EF4-FFF2-40B4-BE49-F238E27FC236}">
@@ -8470,8 +8430,8 @@
         </p:nvSpPr>
         <p:spPr>
           <a:xfrm>
-            <a:off x="810001" y="447188"/>
-            <a:ext cx="3413084" cy="1559412"/>
+            <a:off x="810000" y="447188"/>
+            <a:ext cx="10571998" cy="970450"/>
           </a:xfrm>
         </p:spPr>
         <p:txBody>
@@ -8481,24 +8441,24 @@
           <a:lstStyle/>
           <a:p>
             <a:r>
-              <a:rPr lang="en-US" altLang="zh-CN" sz="3200" dirty="0"/>
+              <a:rPr lang="en-US" altLang="zh-CN"/>
               <a:t>2.3</a:t>
             </a:r>
             <a:r>
-              <a:rPr lang="zh-CN" altLang="en-US" sz="3200" dirty="0"/>
+              <a:rPr lang="zh-CN" altLang="en-US"/>
               <a:t> </a:t>
             </a:r>
             <a:r>
-              <a:rPr lang="en-US" altLang="zh-CN" sz="3200" dirty="0"/>
+              <a:rPr lang="en-US" altLang="zh-CN"/>
               <a:t>Server i18n</a:t>
             </a:r>
-            <a:endParaRPr lang="zh-CN" altLang="en-US" sz="3200" dirty="0"/>
-          </a:p>
-        </p:txBody>
-      </p:sp>
-      <p:sp>
-        <p:nvSpPr>
-          <p:cNvPr id="23" name="Content Placeholder 22">
+            <a:endParaRPr lang="zh-CN" altLang="en-US"/>
+          </a:p>
+        </p:txBody>
+      </p:sp>
+      <p:sp>
+        <p:nvSpPr>
+          <p:cNvPr id="34" name="Content Placeholder 22">
             <a:extLst>
               <a:ext uri="{FF2B5EF4-FFF2-40B4-BE49-F238E27FC236}">
                 <a16:creationId xmlns:a16="http://schemas.microsoft.com/office/drawing/2014/main" id="{C8859431-3FEB-9959-4981-AE58D71060CD}"/>
@@ -8515,7 +8475,7 @@
         <p:spPr>
           <a:xfrm>
             <a:off x="818713" y="2413000"/>
-            <a:ext cx="3404372" cy="3632200"/>
+            <a:ext cx="3835583" cy="3632200"/>
           </a:xfrm>
         </p:spPr>
         <p:txBody>
@@ -8524,88 +8484,27 @@
           </a:bodyPr>
           <a:lstStyle/>
           <a:p>
-            <a:endParaRPr lang="en-US" sz="1600" dirty="0">
-              <a:solidFill>
-                <a:srgbClr val="FFFFFF"/>
-              </a:solidFill>
-            </a:endParaRPr>
-          </a:p>
-        </p:txBody>
-      </p:sp>
-      <p:sp>
-        <p:nvSpPr>
-          <p:cNvPr id="30" name="Rounded Rectangle 17">
+            <a:r>
+              <a:rPr lang="zh-CN" altLang="en-US" sz="1600" dirty="0"/>
+              <a:t>优点：解耦</a:t>
+            </a:r>
+            <a:endParaRPr lang="en-US" altLang="zh-CN" sz="1600" dirty="0"/>
+          </a:p>
+          <a:p>
+            <a:r>
+              <a:rPr lang="zh-CN" altLang="en-US" sz="1600" dirty="0"/>
+              <a:t>缺点：增加后端代码的复杂度</a:t>
+            </a:r>
+            <a:endParaRPr lang="en-US" sz="1600" dirty="0"/>
+          </a:p>
+        </p:txBody>
+      </p:sp>
+      <p:pic>
+        <p:nvPicPr>
+          <p:cNvPr id="6" name="内容占位符 9">
             <a:extLst>
               <a:ext uri="{FF2B5EF4-FFF2-40B4-BE49-F238E27FC236}">
-                <a16:creationId xmlns:a16="http://schemas.microsoft.com/office/drawing/2014/main" id="{567B1EEF-AB32-40F7-AD5F-41E0EA001EBE}"/>
-              </a:ext>
-              <a:ext uri="{C183D7F6-B498-43B3-948B-1728B52AA6E4}">
-                <adec:decorative xmlns:adec="http://schemas.microsoft.com/office/drawing/2017/decorative" val="1"/>
-              </a:ext>
-            </a:extLst>
-          </p:cNvPr>
-          <p:cNvSpPr>
-            <a:spLocks noGrp="1" noRot="1" noChangeAspect="1" noMove="1" noResize="1" noEditPoints="1" noAdjustHandles="1" noChangeArrowheads="1" noChangeShapeType="1" noTextEdit="1"/>
-          </p:cNvSpPr>
-          <p:nvPr>
-            <p:extLst>
-              <p:ext uri="{386F3935-93C4-4BCD-93E2-E3B085C9AB24}">
-                <p16:designElem xmlns:p16="http://schemas.microsoft.com/office/powerpoint/2015/main" val="1"/>
-              </p:ext>
-            </p:extLst>
-          </p:nvPr>
-        </p:nvSpPr>
-        <p:spPr>
-          <a:xfrm>
-            <a:off x="5278945" y="958640"/>
-            <a:ext cx="6269591" cy="4945244"/>
-          </a:xfrm>
-          <a:prstGeom prst="roundRect">
-            <a:avLst>
-              <a:gd name="adj" fmla="val 3513"/>
-            </a:avLst>
-          </a:prstGeom>
-          <a:solidFill>
-            <a:schemeClr val="bg1"/>
-          </a:solidFill>
-          <a:ln>
-            <a:solidFill>
-              <a:schemeClr val="accent1"/>
-            </a:solidFill>
-          </a:ln>
-          <a:effectLst/>
-        </p:spPr>
-        <p:style>
-          <a:lnRef idx="2">
-            <a:schemeClr val="accent1">
-              <a:shade val="50000"/>
-            </a:schemeClr>
-          </a:lnRef>
-          <a:fillRef idx="1">
-            <a:schemeClr val="accent1"/>
-          </a:fillRef>
-          <a:effectRef idx="0">
-            <a:schemeClr val="accent1"/>
-          </a:effectRef>
-          <a:fontRef idx="minor">
-            <a:schemeClr val="lt1"/>
-          </a:fontRef>
-        </p:style>
-        <p:txBody>
-          <a:bodyPr rtlCol="0" anchor="ctr"/>
-          <a:lstStyle/>
-          <a:p>
-            <a:pPr algn="ctr"/>
-            <a:endParaRPr lang="en-US"/>
-          </a:p>
-        </p:txBody>
-      </p:sp>
-      <p:pic>
-        <p:nvPicPr>
-          <p:cNvPr id="19" name="内容占位符 18">
-            <a:extLst>
-              <a:ext uri="{FF2B5EF4-FFF2-40B4-BE49-F238E27FC236}">
-                <a16:creationId xmlns:a16="http://schemas.microsoft.com/office/drawing/2014/main" id="{35190088-E12D-19BF-DC55-7C1A8229E74A}"/>
+                <a16:creationId xmlns:a16="http://schemas.microsoft.com/office/drawing/2014/main" id="{462BCBC5-BA64-0A12-219E-FA1F84876959}"/>
               </a:ext>
             </a:extLst>
           </p:cNvPr>
@@ -8622,12 +8521,20 @@
         </p:blipFill>
         <p:spPr>
           <a:xfrm>
-            <a:off x="5603706" y="2049161"/>
-            <a:ext cx="5638853" cy="2748940"/>
+            <a:off x="5101851" y="2929386"/>
+            <a:ext cx="6277349" cy="2683565"/>
           </a:xfrm>
-          <a:prstGeom prst="rect">
-            <a:avLst/>
+          <a:prstGeom prst="roundRect">
+            <a:avLst>
+              <a:gd name="adj" fmla="val 3876"/>
+            </a:avLst>
           </a:prstGeom>
+          <a:ln>
+            <a:solidFill>
+              <a:schemeClr val="accent1"/>
+            </a:solidFill>
+          </a:ln>
+          <a:effectLst/>
         </p:spPr>
       </p:pic>
     </p:spTree>
@@ -8638,7 +8545,7 @@
     </p:extLst>
   </p:cSld>
   <p:clrMapOvr>
-    <a:overrideClrMapping bg1="lt1" tx1="dk1" bg2="lt2" tx2="dk2" accent1="accent1" accent2="accent2" accent3="accent3" accent4="accent4" accent5="accent5" accent6="accent6" hlink="hlink" folHlink="folHlink"/>
+    <a:masterClrMapping/>
   </p:clrMapOvr>
 </p:sld>
 </file>
@@ -8646,6 +8553,14 @@
 <file path=ppt/slides/slide9.xml><?xml version="1.0" encoding="utf-8"?>
 <p:sld xmlns:a="http://schemas.openxmlformats.org/drawingml/2006/main" xmlns:r="http://schemas.openxmlformats.org/officeDocument/2006/relationships" xmlns:p="http://schemas.openxmlformats.org/presentationml/2006/main">
   <p:cSld>
+    <p:bg>
+      <p:bgPr>
+        <a:solidFill>
+          <a:schemeClr val="bg2"/>
+        </a:solidFill>
+        <a:effectLst/>
+      </p:bgPr>
+    </p:bg>
     <p:spTree>
       <p:nvGrpSpPr>
         <p:cNvPr id="1" name=""/>
@@ -8676,9 +8591,16 @@
             <p:ph type="title"/>
           </p:nvPr>
         </p:nvSpPr>
-        <p:spPr/>
-        <p:txBody>
-          <a:bodyPr/>
+        <p:spPr>
+          <a:xfrm>
+            <a:off x="810000" y="447188"/>
+            <a:ext cx="10571998" cy="970450"/>
+          </a:xfrm>
+        </p:spPr>
+        <p:txBody>
+          <a:bodyPr>
+            <a:normAutofit/>
+          </a:bodyPr>
           <a:lstStyle/>
           <a:p>
             <a:r>
@@ -8691,19 +8613,17 @@
       </p:sp>
       <p:pic>
         <p:nvPicPr>
-          <p:cNvPr id="7" name="内容占位符 9">
+          <p:cNvPr id="5" name="内容占位符 2">
             <a:extLst>
               <a:ext uri="{FF2B5EF4-FFF2-40B4-BE49-F238E27FC236}">
-                <a16:creationId xmlns:a16="http://schemas.microsoft.com/office/drawing/2014/main" id="{4A93EC35-0FF7-1E2D-D9B2-6553DE4BD62E}"/>
+                <a16:creationId xmlns:a16="http://schemas.microsoft.com/office/drawing/2014/main" id="{27851059-0D8D-7BA7-2AD0-C88A6BB60F00}"/>
               </a:ext>
             </a:extLst>
           </p:cNvPr>
           <p:cNvPicPr>
-            <a:picLocks noGrp="1" noChangeAspect="1"/>
+            <a:picLocks noChangeAspect="1"/>
           </p:cNvPicPr>
-          <p:nvPr>
-            <p:ph idx="1"/>
-          </p:nvPr>
+          <p:nvPr/>
         </p:nvPicPr>
         <p:blipFill>
           <a:blip r:embed="rId2"/>
@@ -8713,9 +8633,20 @@
         </p:blipFill>
         <p:spPr>
           <a:xfrm>
-            <a:off x="1844073" y="2222500"/>
-            <a:ext cx="8503853" cy="3636963"/>
+            <a:off x="688340" y="2849186"/>
+            <a:ext cx="10510520" cy="2391142"/>
           </a:xfrm>
+          <a:prstGeom prst="roundRect">
+            <a:avLst>
+              <a:gd name="adj" fmla="val 3876"/>
+            </a:avLst>
+          </a:prstGeom>
+          <a:ln>
+            <a:solidFill>
+              <a:schemeClr val="accent1"/>
+            </a:solidFill>
+          </a:ln>
+          <a:effectLst/>
         </p:spPr>
       </p:pic>
     </p:spTree>
@@ -8969,6 +8900,15 @@
 </file>
 
 <file path=customXml/item1.xml><?xml version="1.0" encoding="utf-8"?>
+<?mso-contentType ?>
+<FormTemplates xmlns="http://schemas.microsoft.com/sharepoint/v3/contenttype/forms">
+  <Display>DocumentLibraryForm</Display>
+  <Edit>DocumentLibraryForm</Edit>
+  <New>DocumentLibraryForm</New>
+</FormTemplates>
+</file>
+
+<file path=customXml/item2.xml><?xml version="1.0" encoding="utf-8"?>
 <ct:contentTypeSchema xmlns:ct="http://schemas.microsoft.com/office/2006/metadata/contentType" xmlns:ma="http://schemas.microsoft.com/office/2006/metadata/properties/metaAttributes" ct:_="" ma:_="" ma:contentTypeName="Document" ma:contentTypeID="0x0101006B886C1937BB734A8747F41E0FB68E69" ma:contentTypeVersion="6" ma:contentTypeDescription="Create a new document." ma:contentTypeScope="" ma:versionID="410c2737be7626d44b05604589b71d98">
   <xsd:schema xmlns:xsd="http://www.w3.org/2001/XMLSchema" xmlns:xs="http://www.w3.org/2001/XMLSchema" xmlns:p="http://schemas.microsoft.com/office/2006/metadata/properties" xmlns:ns3="e061f490-23ee-4aab-8a4e-2ffb679ebedb" targetNamespace="http://schemas.microsoft.com/office/2006/metadata/properties" ma:root="true" ma:fieldsID="d6f422ee6a0c9e34dcdb2722dc63cc68" ns3:_="">
     <xsd:import namespace="e061f490-23ee-4aab-8a4e-2ffb679ebedb"/>
@@ -9126,15 +9066,6 @@
 </ct:contentTypeSchema>
 </file>
 
-<file path=customXml/item2.xml><?xml version="1.0" encoding="utf-8"?>
-<?mso-contentType ?>
-<FormTemplates xmlns="http://schemas.microsoft.com/sharepoint/v3/contenttype/forms">
-  <Display>DocumentLibraryForm</Display>
-  <Edit>DocumentLibraryForm</Edit>
-  <New>DocumentLibraryForm</New>
-</FormTemplates>
-</file>
-
 <file path=customXml/item3.xml><?xml version="1.0" encoding="utf-8"?>
 <p:properties xmlns:p="http://schemas.microsoft.com/office/2006/metadata/properties" xmlns:xsi="http://www.w3.org/2001/XMLSchema-instance" xmlns:pc="http://schemas.microsoft.com/office/infopath/2007/PartnerControls">
   <documentManagement/>
@@ -9142,6 +9073,14 @@
 </file>
 
 <file path=customXml/itemProps1.xml><?xml version="1.0" encoding="utf-8"?>
+<ds:datastoreItem xmlns:ds="http://schemas.openxmlformats.org/officeDocument/2006/customXml" ds:itemID="{6481029E-692A-4939-A2C5-C2D1694F6F31}">
+  <ds:schemaRefs>
+    <ds:schemaRef ds:uri="http://schemas.microsoft.com/sharepoint/v3/contenttype/forms"/>
+  </ds:schemaRefs>
+</ds:datastoreItem>
+</file>
+
+<file path=customXml/itemProps2.xml><?xml version="1.0" encoding="utf-8"?>
 <ds:datastoreItem xmlns:ds="http://schemas.openxmlformats.org/officeDocument/2006/customXml" ds:itemID="{97D837AD-7F09-481A-AB3A-9B5FB4E4ADF8}">
   <ds:schemaRefs>
     <ds:schemaRef ds:uri="http://schemas.microsoft.com/office/2006/metadata/contentType"/>
@@ -9155,14 +9094,6 @@
     <ds:schemaRef ds:uri="http://purl.org/dc/elements/1.1/"/>
     <ds:schemaRef ds:uri="http://purl.org/dc/terms/"/>
     <ds:schemaRef ds:uri="http://schemas.microsoft.com/internal/obd"/>
-  </ds:schemaRefs>
-</ds:datastoreItem>
-</file>
-
-<file path=customXml/itemProps2.xml><?xml version="1.0" encoding="utf-8"?>
-<ds:datastoreItem xmlns:ds="http://schemas.openxmlformats.org/officeDocument/2006/customXml" ds:itemID="{6481029E-692A-4939-A2C5-C2D1694F6F31}">
-  <ds:schemaRefs>
-    <ds:schemaRef ds:uri="http://schemas.microsoft.com/sharepoint/v3/contenttype/forms"/>
   </ds:schemaRefs>
 </ds:datastoreItem>
 </file>

</xml_diff>